<commit_message>
primera parte issue 21
</commit_message>
<xml_diff>
--- a/obras/static/ppt/ppt-generados/balance_general_1.pptx
+++ b/obras/static/ppt/ppt-generados/balance_general_1.pptx
@@ -6610,7 +6610,7 @@
           <a:p>
             <a:pPr algn="ctr"/>
             <a:r>
-              <a:t>24,340</a:t>
+              <a:t>24,341</a:t>
             </a:r>
             <a:endParaRPr lang="es-MX" sz="1400" dirty="0">
               <a:solidFill>
@@ -6645,7 +6645,7 @@
           <a:p>
             <a:pPr algn="ctr"/>
             <a:r>
-              <a:t>$ 5,348,189.05</a:t>
+              <a:t>$ 5,348,204.05</a:t>
             </a:r>
             <a:endParaRPr lang="es-MX" sz="1400" dirty="0">
               <a:latin typeface="Arial Narrow" panose="020B0606020202030204" pitchFamily="34" charset="0"/>
@@ -6677,7 +6677,7 @@
           <a:p>
             <a:pPr algn="ctr"/>
             <a:r>
-              <a:t>8,343</a:t>
+              <a:t>8,344</a:t>
             </a:r>
             <a:endParaRPr lang="es-MX" sz="1400" dirty="0">
               <a:latin typeface="Arial Narrow" panose="020B0606020202030204" pitchFamily="34" charset="0"/>
@@ -6709,7 +6709,7 @@
           <a:p>
             <a:pPr algn="ctr"/>
             <a:r>
-              <a:t>$ 2,241,327.15</a:t>
+              <a:t>$ 2,241,342.15</a:t>
             </a:r>
             <a:endParaRPr lang="es-MX" sz="1400" dirty="0">
               <a:latin typeface="Arial Narrow" panose="020B0606020202030204" pitchFamily="34" charset="0"/>

</xml_diff>

<commit_message>
estilo login viñetas,  ssl en ajax y css
</commit_message>
<xml_diff>
--- a/obras/static/ppt/ppt-generados/balance_general_1.pptx
+++ b/obras/static/ppt/ppt-generados/balance_general_1.pptx
@@ -6645,7 +6645,7 @@
           <a:p>
             <a:pPr algn="ctr"/>
             <a:r>
-              <a:t>$ 5,348,204.05</a:t>
+              <a:t>$ 5,348,214.05</a:t>
             </a:r>
             <a:endParaRPr lang="es-MX" sz="1400" dirty="0">
               <a:latin typeface="Arial Narrow" panose="020B0606020202030204" pitchFamily="34" charset="0"/>
@@ -6709,7 +6709,7 @@
           <a:p>
             <a:pPr algn="ctr"/>
             <a:r>
-              <a:t>$ 2,241,342.15</a:t>
+              <a:t>$ 2,241,352.15</a:t>
             </a:r>
             <a:endParaRPr lang="es-MX" sz="1400" dirty="0">
               <a:latin typeface="Arial Narrow" panose="020B0606020202030204" pitchFamily="34" charset="0"/>

</xml_diff>